<commit_message>
Add new images and minor adjustments to PPP
</commit_message>
<xml_diff>
--- a/Dokumentation/Präsentation/BAT_Zwischenpraesentation.pptx
+++ b/Dokumentation/Präsentation/BAT_Zwischenpraesentation.pptx
@@ -3536,7 +3536,7 @@
           <a:p>
             <a:fld id="{999A8DD2-C443-44AD-85B3-4CE72B962C5F}" type="datetimeFigureOut">
               <a:rPr lang="en-US" smtClean="0"/>
-              <a:t>4/8/2024</a:t>
+              <a:t>4/14/2024</a:t>
             </a:fld>
             <a:endParaRPr lang="en-US"/>
           </a:p>
@@ -3744,7 +3744,7 @@
           <a:p>
             <a:fld id="{999A8DD2-C443-44AD-85B3-4CE72B962C5F}" type="datetimeFigureOut">
               <a:rPr lang="en-US" smtClean="0"/>
-              <a:t>4/8/2024</a:t>
+              <a:t>4/14/2024</a:t>
             </a:fld>
             <a:endParaRPr lang="en-US"/>
           </a:p>
@@ -3952,7 +3952,7 @@
           <a:p>
             <a:fld id="{999A8DD2-C443-44AD-85B3-4CE72B962C5F}" type="datetimeFigureOut">
               <a:rPr lang="en-US" smtClean="0"/>
-              <a:t>4/8/2024</a:t>
+              <a:t>4/14/2024</a:t>
             </a:fld>
             <a:endParaRPr lang="en-US"/>
           </a:p>
@@ -4150,7 +4150,7 @@
           <a:p>
             <a:fld id="{999A8DD2-C443-44AD-85B3-4CE72B962C5F}" type="datetimeFigureOut">
               <a:rPr lang="en-US" smtClean="0"/>
-              <a:t>4/8/2024</a:t>
+              <a:t>4/14/2024</a:t>
             </a:fld>
             <a:endParaRPr lang="en-US"/>
           </a:p>
@@ -4428,7 +4428,7 @@
           <a:p>
             <a:fld id="{999A8DD2-C443-44AD-85B3-4CE72B962C5F}" type="datetimeFigureOut">
               <a:rPr lang="en-US" smtClean="0"/>
-              <a:t>4/8/2024</a:t>
+              <a:t>4/14/2024</a:t>
             </a:fld>
             <a:endParaRPr lang="en-US"/>
           </a:p>
@@ -4700,7 +4700,7 @@
           <a:p>
             <a:fld id="{999A8DD2-C443-44AD-85B3-4CE72B962C5F}" type="datetimeFigureOut">
               <a:rPr lang="en-US" smtClean="0"/>
-              <a:t>4/8/2024</a:t>
+              <a:t>4/14/2024</a:t>
             </a:fld>
             <a:endParaRPr lang="en-US"/>
           </a:p>
@@ -5124,7 +5124,7 @@
           <a:p>
             <a:fld id="{999A8DD2-C443-44AD-85B3-4CE72B962C5F}" type="datetimeFigureOut">
               <a:rPr lang="en-US" smtClean="0"/>
-              <a:t>4/8/2024</a:t>
+              <a:t>4/14/2024</a:t>
             </a:fld>
             <a:endParaRPr lang="en-US"/>
           </a:p>
@@ -5265,7 +5265,7 @@
           <a:p>
             <a:fld id="{999A8DD2-C443-44AD-85B3-4CE72B962C5F}" type="datetimeFigureOut">
               <a:rPr lang="en-US" smtClean="0"/>
-              <a:t>4/8/2024</a:t>
+              <a:t>4/14/2024</a:t>
             </a:fld>
             <a:endParaRPr lang="en-US"/>
           </a:p>
@@ -5378,7 +5378,7 @@
           <a:p>
             <a:fld id="{999A8DD2-C443-44AD-85B3-4CE72B962C5F}" type="datetimeFigureOut">
               <a:rPr lang="en-US" smtClean="0"/>
-              <a:t>4/8/2024</a:t>
+              <a:t>4/14/2024</a:t>
             </a:fld>
             <a:endParaRPr lang="en-US"/>
           </a:p>
@@ -5697,7 +5697,7 @@
           <a:p>
             <a:fld id="{999A8DD2-C443-44AD-85B3-4CE72B962C5F}" type="datetimeFigureOut">
               <a:rPr lang="en-US" smtClean="0"/>
-              <a:t>4/8/2024</a:t>
+              <a:t>4/14/2024</a:t>
             </a:fld>
             <a:endParaRPr lang="en-US"/>
           </a:p>
@@ -5991,7 +5991,7 @@
           <a:p>
             <a:fld id="{999A8DD2-C443-44AD-85B3-4CE72B962C5F}" type="datetimeFigureOut">
               <a:rPr lang="en-US" smtClean="0"/>
-              <a:t>4/8/2024</a:t>
+              <a:t>4/14/2024</a:t>
             </a:fld>
             <a:endParaRPr lang="en-US"/>
           </a:p>
@@ -6231,7 +6231,7 @@
           <a:p>
             <a:fld id="{999A8DD2-C443-44AD-85B3-4CE72B962C5F}" type="datetimeFigureOut">
               <a:rPr lang="en-US" smtClean="0"/>
-              <a:t>4/8/2024</a:t>
+              <a:t>4/14/2024</a:t>
             </a:fld>
             <a:endParaRPr lang="en-US"/>
           </a:p>
@@ -8487,13 +8487,13 @@
               </a:ext>
             </a:extLst>
           </a:blip>
-          <a:srcRect l="10720" t="38063" r="35489" b="12162"/>
+          <a:srcRect l="10720" t="38063" r="41020" b="12162"/>
           <a:stretch/>
         </p:blipFill>
         <p:spPr>
           <a:xfrm>
             <a:off x="8534400" y="1485902"/>
-            <a:ext cx="3044952" cy="4229100"/>
+            <a:ext cx="2731826" cy="4229100"/>
           </a:xfrm>
           <a:prstGeom prst="ellipse">
             <a:avLst/>
@@ -9234,6 +9234,36 @@
           </a:p>
         </p:txBody>
       </p:sp>
+      <p:pic>
+        <p:nvPicPr>
+          <p:cNvPr id="6" name="Grafik 5">
+            <a:extLst>
+              <a:ext uri="{FF2B5EF4-FFF2-40B4-BE49-F238E27FC236}">
+                <a16:creationId xmlns:a16="http://schemas.microsoft.com/office/drawing/2014/main" id="{C07D3D33-24EC-759E-4FFF-60E680368C35}"/>
+              </a:ext>
+            </a:extLst>
+          </p:cNvPr>
+          <p:cNvPicPr>
+            <a:picLocks noChangeAspect="1"/>
+          </p:cNvPicPr>
+          <p:nvPr/>
+        </p:nvPicPr>
+        <p:blipFill>
+          <a:blip r:embed="rId4"/>
+          <a:stretch>
+            <a:fillRect/>
+          </a:stretch>
+        </p:blipFill>
+        <p:spPr>
+          <a:xfrm>
+            <a:off x="5447360" y="1715532"/>
+            <a:ext cx="6339640" cy="4358879"/>
+          </a:xfrm>
+          <a:prstGeom prst="rect">
+            <a:avLst/>
+          </a:prstGeom>
+        </p:spPr>
+      </p:pic>
     </p:spTree>
     <p:extLst>
       <p:ext uri="{BB962C8B-B14F-4D97-AF65-F5344CB8AC3E}">
@@ -9658,7 +9688,7 @@
       </p:sp>
       <p:pic>
         <p:nvPicPr>
-          <p:cNvPr id="6" name="Inhaltsplatzhalter 5" descr="Ein Bild, das Text, Screenshot, Schrift, Design enthält.&#10;&#10;Automatisch generierte Beschreibung">
+          <p:cNvPr id="6" name="Inhaltsplatzhalter 5">
             <a:extLst>
               <a:ext uri="{FF2B5EF4-FFF2-40B4-BE49-F238E27FC236}">
                 <a16:creationId xmlns:a16="http://schemas.microsoft.com/office/drawing/2014/main" id="{A63A1F95-8652-9154-C4B1-485560096680}"/>
@@ -9680,9 +9710,8 @@
               </a:ext>
             </a:extLst>
           </a:blip>
-          <a:stretch>
-            <a:fillRect/>
-          </a:stretch>
+          <a:srcRect/>
+          <a:stretch/>
         </p:blipFill>
         <p:spPr>
           <a:xfrm>

</xml_diff>